<commit_message>
Resource model updated. User now has 1:1 relation to the calendar
- Added icons
- Adjusted metadata
</commit_message>
<xml_diff>
--- a/package/doc/Resource Model.pptx
+++ b/package/doc/Resource Model.pptx
@@ -108,6 +108,11 @@
       </a:defRPr>
     </a:lvl9pPr>
   </p:defaultTextStyle>
+  <p:extLst>
+    <p:ext uri="{EFAFB233-063F-42B5-8137-9DF3F51BA10A}">
+      <p15:sldGuideLst xmlns:p15="http://schemas.microsoft.com/office/powerpoint/2012/main"/>
+    </p:ext>
+  </p:extLst>
 </p:presentation>
 </file>
 
@@ -193,7 +198,7 @@
           <a:p>
             <a:fld id="{AB74EF8E-57D9-424A-9469-6FDF15ABECB9}" type="datetimeFigureOut">
               <a:rPr lang="ru-RU" smtClean="0"/>
-              <a:t>09.12.2014</a:t>
+              <a:t>10.12.2014</a:t>
             </a:fld>
             <a:endParaRPr lang="ru-RU"/>
           </a:p>
@@ -6445,7 +6450,7 @@
             <a:fld id="{07C7A9F4-8367-4992-889A-81050C8639EA}" type="datetime3">
               <a:rPr lang="en-US" altLang="ru-RU" smtClean="0"/>
               <a:pPr/>
-              <a:t>9 December 2014</a:t>
+              <a:t>10 December 2014</a:t>
             </a:fld>
             <a:endParaRPr lang="ru-RU" altLang="ru-RU" dirty="0" smtClean="0"/>
           </a:p>
@@ -6481,11 +6486,7 @@
             </a:r>
             <a:r>
               <a:rPr lang="en-US" altLang="ru-RU" dirty="0" smtClean="0"/>
-              <a:t> </a:t>
-            </a:r>
-            <a:r>
-              <a:rPr lang="en-US" altLang="ru-RU" dirty="0" smtClean="0"/>
-              <a:t>Resource Model</a:t>
+              <a:t> Resource Model</a:t>
             </a:r>
             <a:endParaRPr lang="ru-RU" altLang="ru-RU" dirty="0" smtClean="0"/>
           </a:p>
@@ -6538,8 +6539,8 @@
         </p:nvSpPr>
         <p:spPr bwMode="auto">
           <a:xfrm>
-            <a:off x="6048375" y="150813"/>
-            <a:ext cx="4362450" cy="5770562"/>
+            <a:off x="4706021" y="150813"/>
+            <a:ext cx="5704804" cy="5770562"/>
           </a:xfrm>
           <a:prstGeom prst="rect">
             <a:avLst/>
@@ -6608,7 +6609,7 @@
         </p:nvSpPr>
         <p:spPr bwMode="auto">
           <a:xfrm>
-            <a:off x="3168650" y="2164449"/>
+            <a:off x="2443733" y="2235457"/>
             <a:ext cx="1620838" cy="539750"/>
           </a:xfrm>
           <a:prstGeom prst="rect">
@@ -7789,7 +7790,7 @@
         <p:spPr bwMode="auto">
           <a:xfrm>
             <a:off x="1909763" y="150813"/>
-            <a:ext cx="4144962" cy="5770562"/>
+            <a:ext cx="2783558" cy="5770562"/>
           </a:xfrm>
           <a:prstGeom prst="rect">
             <a:avLst/>
@@ -7943,7 +7944,7 @@
         </p:nvSpPr>
         <p:spPr bwMode="auto">
           <a:xfrm>
-            <a:off x="1927226" y="157164"/>
+            <a:off x="1897063" y="429420"/>
             <a:ext cx="1425575" cy="255587"/>
           </a:xfrm>
           <a:prstGeom prst="rect">
@@ -8194,7 +8195,7 @@
         </p:nvGrpSpPr>
         <p:grpSpPr bwMode="auto">
           <a:xfrm>
-            <a:off x="4695031" y="2310499"/>
+            <a:off x="3978276" y="2381507"/>
             <a:ext cx="250825" cy="247650"/>
             <a:chOff x="1081088" y="1468438"/>
             <a:chExt cx="250246" cy="248358"/>
@@ -8493,8 +8494,8 @@
         </p:nvCxnSpPr>
         <p:spPr bwMode="auto">
           <a:xfrm flipV="1">
-            <a:off x="4945856" y="1001714"/>
-            <a:ext cx="1310354" cy="1465948"/>
+            <a:off x="4229101" y="1001714"/>
+            <a:ext cx="2027109" cy="1536956"/>
           </a:xfrm>
           <a:prstGeom prst="bentConnector3">
             <a:avLst>
@@ -8850,8 +8851,8 @@
         </p:nvSpPr>
         <p:spPr bwMode="auto">
           <a:xfrm>
-            <a:off x="6224588" y="1769272"/>
-            <a:ext cx="4033837" cy="4005452"/>
+            <a:off x="5599114" y="1769272"/>
+            <a:ext cx="4659311" cy="4005452"/>
           </a:xfrm>
           <a:prstGeom prst="rect">
             <a:avLst/>
@@ -8922,7 +8923,7 @@
         </p:nvSpPr>
         <p:spPr bwMode="auto">
           <a:xfrm>
-            <a:off x="6435598" y="2835267"/>
+            <a:off x="5970809" y="2687134"/>
             <a:ext cx="1620838" cy="539750"/>
           </a:xfrm>
           <a:prstGeom prst="rect">
@@ -9025,7 +9026,7 @@
         </p:nvGrpSpPr>
         <p:grpSpPr bwMode="auto">
           <a:xfrm>
-            <a:off x="7015161" y="1170784"/>
+            <a:off x="6842488" y="1129143"/>
             <a:ext cx="250825" cy="247650"/>
             <a:chOff x="1081088" y="1468438"/>
             <a:chExt cx="250246" cy="248358"/>
@@ -9252,7 +9253,7 @@
         </p:nvSpPr>
         <p:spPr bwMode="auto">
           <a:xfrm>
-            <a:off x="7086598" y="2759749"/>
+            <a:off x="6619974" y="2596945"/>
             <a:ext cx="179388" cy="180975"/>
           </a:xfrm>
           <a:prstGeom prst="rect">
@@ -9323,9 +9324,9 @@
           <p:nvPr/>
         </p:nvCxnSpPr>
         <p:spPr bwMode="auto">
-          <a:xfrm rot="16200000" flipV="1">
-            <a:off x="6505239" y="2088695"/>
-            <a:ext cx="1341315" cy="793"/>
+          <a:xfrm rot="5400000" flipH="1" flipV="1">
+            <a:off x="6246171" y="1840290"/>
+            <a:ext cx="1220152" cy="293158"/>
           </a:xfrm>
           <a:prstGeom prst="bentConnector3">
             <a:avLst>
@@ -9367,7 +9368,7 @@
         </p:nvSpPr>
         <p:spPr bwMode="auto">
           <a:xfrm>
-            <a:off x="8827293" y="2997733"/>
+            <a:off x="8539163" y="2770355"/>
             <a:ext cx="1106488" cy="406400"/>
           </a:xfrm>
           <a:prstGeom prst="rect">
@@ -9464,7 +9465,7 @@
         </p:nvSpPr>
         <p:spPr bwMode="auto">
           <a:xfrm>
-            <a:off x="8000069" y="3024179"/>
+            <a:off x="7558423" y="2883068"/>
             <a:ext cx="179388" cy="180975"/>
           </a:xfrm>
           <a:prstGeom prst="rect">
@@ -9621,312 +9622,6 @@
           </a:p>
         </p:txBody>
       </p:sp>
-      <p:sp>
-        <p:nvSpPr>
-          <p:cNvPr id="175" name="Rectangle 92"/>
-          <p:cNvSpPr>
-            <a:spLocks noChangeArrowheads="1"/>
-          </p:cNvSpPr>
-          <p:nvPr/>
-        </p:nvSpPr>
-        <p:spPr bwMode="auto">
-          <a:xfrm>
-            <a:off x="8828292" y="4420636"/>
-            <a:ext cx="1106488" cy="406400"/>
-          </a:xfrm>
-          <a:prstGeom prst="rect">
-            <a:avLst/>
-          </a:prstGeom>
-          <a:gradFill rotWithShape="1">
-            <a:gsLst>
-              <a:gs pos="0">
-                <a:srgbClr val="FFEFDE"/>
-              </a:gs>
-              <a:gs pos="64999">
-                <a:srgbClr val="FFD9AF"/>
-              </a:gs>
-              <a:gs pos="100000">
-                <a:srgbClr val="FFCA8D"/>
-              </a:gs>
-            </a:gsLst>
-            <a:lin ang="5400000" scaled="1"/>
-          </a:gradFill>
-          <a:ln w="9525">
-            <a:solidFill>
-              <a:srgbClr val="E09330"/>
-            </a:solidFill>
-            <a:miter lim="800000"/>
-            <a:headEnd/>
-            <a:tailEnd/>
-          </a:ln>
-          <a:effectLst>
-            <a:outerShdw blurRad="40000" dist="20000" dir="5400000" rotWithShape="0">
-              <a:srgbClr val="808080">
-                <a:alpha val="37999"/>
-              </a:srgbClr>
-            </a:outerShdw>
-          </a:effectLst>
-        </p:spPr>
-        <p:txBody>
-          <a:bodyPr lIns="0" tIns="0" rIns="0" bIns="0" anchor="ctr"/>
-          <a:lstStyle/>
-          <a:p>
-            <a:pPr algn="ctr" eaLnBrk="1" hangingPunct="1">
-              <a:defRPr/>
-            </a:pPr>
-            <a:r>
-              <a:rPr lang="en-US" sz="1050" b="1" dirty="0">
-                <a:solidFill>
-                  <a:schemeClr val="tx1"/>
-                </a:solidFill>
-                <a:latin typeface="Calibri" pitchFamily="34" charset="0"/>
-                <a:ea typeface="+mn-ea"/>
-                <a:cs typeface="Calibri" pitchFamily="34" charset="0"/>
-              </a:rPr>
-              <a:t>/</a:t>
-            </a:r>
-            <a:r>
-              <a:rPr lang="en-US" sz="1050" b="1" dirty="0" err="1" smtClean="0">
-                <a:solidFill>
-                  <a:schemeClr val="tx1"/>
-                </a:solidFill>
-                <a:latin typeface="Calibri" pitchFamily="34" charset="0"/>
-                <a:ea typeface="+mn-ea"/>
-                <a:cs typeface="Calibri" pitchFamily="34" charset="0"/>
-              </a:rPr>
-              <a:t>poa</a:t>
-            </a:r>
-            <a:r>
-              <a:rPr lang="en-US" sz="1050" b="1" dirty="0" smtClean="0">
-                <a:solidFill>
-                  <a:schemeClr val="tx1"/>
-                </a:solidFill>
-                <a:latin typeface="Calibri" pitchFamily="34" charset="0"/>
-                <a:ea typeface="+mn-ea"/>
-                <a:cs typeface="Calibri" pitchFamily="34" charset="0"/>
-              </a:rPr>
-              <a:t>/user</a:t>
-            </a:r>
-            <a:endParaRPr lang="en-US" sz="1050" b="1" dirty="0">
-              <a:solidFill>
-                <a:schemeClr val="tx1"/>
-              </a:solidFill>
-              <a:latin typeface="Calibri" pitchFamily="34" charset="0"/>
-              <a:ea typeface="+mn-ea"/>
-              <a:cs typeface="Calibri" pitchFamily="34" charset="0"/>
-            </a:endParaRPr>
-          </a:p>
-        </p:txBody>
-      </p:sp>
-      <p:grpSp>
-        <p:nvGrpSpPr>
-          <p:cNvPr id="176" name="Group 4"/>
-          <p:cNvGrpSpPr>
-            <a:grpSpLocks/>
-          </p:cNvGrpSpPr>
-          <p:nvPr/>
-        </p:nvGrpSpPr>
-        <p:grpSpPr bwMode="auto">
-          <a:xfrm>
-            <a:off x="7948023" y="4509177"/>
-            <a:ext cx="250825" cy="247650"/>
-            <a:chOff x="1081088" y="1468438"/>
-            <a:chExt cx="250246" cy="248358"/>
-          </a:xfrm>
-        </p:grpSpPr>
-        <p:sp>
-          <p:nvSpPr>
-            <p:cNvPr id="177" name="Rectangle 176"/>
-            <p:cNvSpPr>
-              <a:spLocks noChangeArrowheads="1"/>
-            </p:cNvSpPr>
-            <p:nvPr/>
-          </p:nvSpPr>
-          <p:spPr bwMode="auto">
-            <a:xfrm>
-              <a:off x="1081088" y="1468438"/>
-              <a:ext cx="180557" cy="181492"/>
-            </a:xfrm>
-            <a:prstGeom prst="rect">
-              <a:avLst/>
-            </a:prstGeom>
-            <a:gradFill rotWithShape="1">
-              <a:gsLst>
-                <a:gs pos="0">
-                  <a:srgbClr val="EDF3FA"/>
-                </a:gs>
-                <a:gs pos="64999">
-                  <a:srgbClr val="D3E1F1"/>
-                </a:gs>
-                <a:gs pos="100000">
-                  <a:srgbClr val="C1D6EC"/>
-                </a:gs>
-              </a:gsLst>
-              <a:lin ang="5400000" scaled="1"/>
-            </a:gradFill>
-            <a:ln w="9525">
-              <a:solidFill>
-                <a:srgbClr val="859BB1"/>
-              </a:solidFill>
-              <a:miter lim="800000"/>
-              <a:headEnd/>
-              <a:tailEnd/>
-            </a:ln>
-            <a:effectLst>
-              <a:outerShdw blurRad="40000" dist="20000" dir="5400000" rotWithShape="0">
-                <a:srgbClr val="808080">
-                  <a:alpha val="37999"/>
-                </a:srgbClr>
-              </a:outerShdw>
-            </a:effectLst>
-          </p:spPr>
-          <p:txBody>
-            <a:bodyPr lIns="0" tIns="0" rIns="0" bIns="0" anchor="ctr"/>
-            <a:lstStyle/>
-            <a:p>
-              <a:pPr algn="ctr" eaLnBrk="1" hangingPunct="1">
-                <a:defRPr/>
-              </a:pPr>
-              <a:endParaRPr lang="en-US" b="0" dirty="0">
-                <a:solidFill>
-                  <a:schemeClr val="tx1"/>
-                </a:solidFill>
-                <a:latin typeface="Calibri" pitchFamily="34" charset="0"/>
-                <a:ea typeface="+mn-ea"/>
-                <a:cs typeface="Calibri" pitchFamily="34" charset="0"/>
-              </a:endParaRPr>
-            </a:p>
-          </p:txBody>
-        </p:sp>
-        <p:sp>
-          <p:nvSpPr>
-            <p:cNvPr id="178" name="Rectangle 92"/>
-            <p:cNvSpPr>
-              <a:spLocks noChangeArrowheads="1"/>
-            </p:cNvSpPr>
-            <p:nvPr/>
-          </p:nvSpPr>
-          <p:spPr bwMode="auto">
-            <a:xfrm>
-              <a:off x="1115932" y="1501870"/>
-              <a:ext cx="180557" cy="181492"/>
-            </a:xfrm>
-            <a:prstGeom prst="rect">
-              <a:avLst/>
-            </a:prstGeom>
-            <a:gradFill rotWithShape="1">
-              <a:gsLst>
-                <a:gs pos="0">
-                  <a:srgbClr val="EDF3FA"/>
-                </a:gs>
-                <a:gs pos="64999">
-                  <a:srgbClr val="D3E1F1"/>
-                </a:gs>
-                <a:gs pos="100000">
-                  <a:srgbClr val="C1D6EC"/>
-                </a:gs>
-              </a:gsLst>
-              <a:lin ang="5400000" scaled="1"/>
-            </a:gradFill>
-            <a:ln w="9525">
-              <a:solidFill>
-                <a:srgbClr val="859BB1"/>
-              </a:solidFill>
-              <a:miter lim="800000"/>
-              <a:headEnd/>
-              <a:tailEnd/>
-            </a:ln>
-            <a:effectLst>
-              <a:outerShdw blurRad="40000" dist="20000" dir="5400000" rotWithShape="0">
-                <a:srgbClr val="808080">
-                  <a:alpha val="37999"/>
-                </a:srgbClr>
-              </a:outerShdw>
-            </a:effectLst>
-          </p:spPr>
-          <p:txBody>
-            <a:bodyPr lIns="0" tIns="0" rIns="0" bIns="0" anchor="ctr"/>
-            <a:lstStyle/>
-            <a:p>
-              <a:pPr algn="ctr" eaLnBrk="1" hangingPunct="1">
-                <a:defRPr/>
-              </a:pPr>
-              <a:endParaRPr lang="en-US" b="0" dirty="0">
-                <a:solidFill>
-                  <a:schemeClr val="tx1"/>
-                </a:solidFill>
-                <a:latin typeface="Calibri" pitchFamily="34" charset="0"/>
-                <a:ea typeface="+mn-ea"/>
-                <a:cs typeface="Calibri" pitchFamily="34" charset="0"/>
-              </a:endParaRPr>
-            </a:p>
-          </p:txBody>
-        </p:sp>
-        <p:sp>
-          <p:nvSpPr>
-            <p:cNvPr id="180" name="Rectangle 92"/>
-            <p:cNvSpPr>
-              <a:spLocks noChangeArrowheads="1"/>
-            </p:cNvSpPr>
-            <p:nvPr/>
-          </p:nvSpPr>
-          <p:spPr bwMode="auto">
-            <a:xfrm>
-              <a:off x="1150777" y="1535304"/>
-              <a:ext cx="180557" cy="181492"/>
-            </a:xfrm>
-            <a:prstGeom prst="rect">
-              <a:avLst/>
-            </a:prstGeom>
-            <a:gradFill rotWithShape="1">
-              <a:gsLst>
-                <a:gs pos="0">
-                  <a:srgbClr val="EDF3FA"/>
-                </a:gs>
-                <a:gs pos="64999">
-                  <a:srgbClr val="D3E1F1"/>
-                </a:gs>
-                <a:gs pos="100000">
-                  <a:srgbClr val="C1D6EC"/>
-                </a:gs>
-              </a:gsLst>
-              <a:lin ang="5400000" scaled="1"/>
-            </a:gradFill>
-            <a:ln w="9525">
-              <a:solidFill>
-                <a:srgbClr val="859BB1"/>
-              </a:solidFill>
-              <a:miter lim="800000"/>
-              <a:headEnd/>
-              <a:tailEnd/>
-            </a:ln>
-            <a:effectLst>
-              <a:outerShdw blurRad="40000" dist="20000" dir="5400000" rotWithShape="0">
-                <a:srgbClr val="808080">
-                  <a:alpha val="37999"/>
-                </a:srgbClr>
-              </a:outerShdw>
-            </a:effectLst>
-          </p:spPr>
-          <p:txBody>
-            <a:bodyPr lIns="0" tIns="0" rIns="0" bIns="0" anchor="ctr"/>
-            <a:lstStyle/>
-            <a:p>
-              <a:pPr algn="ctr" eaLnBrk="1" hangingPunct="1">
-                <a:defRPr/>
-              </a:pPr>
-              <a:endParaRPr lang="en-US" b="0" dirty="0">
-                <a:solidFill>
-                  <a:schemeClr val="tx1"/>
-                </a:solidFill>
-                <a:latin typeface="Calibri" pitchFamily="34" charset="0"/>
-                <a:ea typeface="+mn-ea"/>
-                <a:cs typeface="Calibri" pitchFamily="34" charset="0"/>
-              </a:endParaRPr>
-            </a:p>
-          </p:txBody>
-        </p:sp>
-      </p:grpSp>
       <p:grpSp>
         <p:nvGrpSpPr>
           <p:cNvPr id="181" name="Group 40"/>
@@ -9937,7 +9632,7 @@
         </p:nvGrpSpPr>
         <p:grpSpPr bwMode="auto">
           <a:xfrm>
-            <a:off x="7070723" y="3279657"/>
+            <a:off x="6619974" y="3119959"/>
             <a:ext cx="250825" cy="247650"/>
             <a:chOff x="1081088" y="1468438"/>
             <a:chExt cx="250246" cy="248358"/>
@@ -10159,15 +9854,15 @@
           <p:cNvPr id="186" name="Прямая со стрелкой 2"/>
           <p:cNvCxnSpPr>
             <a:cxnSpLocks noChangeShapeType="1"/>
-            <a:stCxn id="219" idx="0"/>
+            <a:stCxn id="70" idx="0"/>
             <a:endCxn id="184" idx="2"/>
           </p:cNvCxnSpPr>
           <p:nvPr/>
         </p:nvCxnSpPr>
         <p:spPr bwMode="auto">
           <a:xfrm rot="16200000" flipV="1">
-            <a:off x="6866088" y="3892281"/>
-            <a:ext cx="730741" cy="793"/>
+            <a:off x="6563976" y="3583945"/>
+            <a:ext cx="851946" cy="419274"/>
           </a:xfrm>
           <a:prstGeom prst="bentConnector3">
             <a:avLst>
@@ -10201,48 +9896,6 @@
       </p:cxnSp>
       <p:cxnSp>
         <p:nvCxnSpPr>
-          <p:cNvPr id="242" name="Elbow Connector 241"/>
-          <p:cNvCxnSpPr>
-            <a:stCxn id="180" idx="3"/>
-            <a:endCxn id="175" idx="1"/>
-          </p:cNvCxnSpPr>
-          <p:nvPr/>
-        </p:nvCxnSpPr>
-        <p:spPr bwMode="auto">
-          <a:xfrm flipV="1">
-            <a:off x="8198848" y="4623836"/>
-            <a:ext cx="629444" cy="42504"/>
-          </a:xfrm>
-          <a:prstGeom prst="bentConnector3">
-            <a:avLst/>
-          </a:prstGeom>
-          <a:noFill/>
-          <a:ln w="12700">
-            <a:solidFill>
-              <a:schemeClr val="tx1"/>
-            </a:solidFill>
-            <a:miter lim="800000"/>
-            <a:headEnd type="none" w="med" len="med"/>
-            <a:tailEnd type="triangle"/>
-          </a:ln>
-          <a:effectLst>
-            <a:outerShdw blurRad="40000" dist="20000" dir="5400000" rotWithShape="0">
-              <a:srgbClr val="808080">
-                <a:alpha val="37999"/>
-              </a:srgbClr>
-            </a:outerShdw>
-          </a:effectLst>
-          <a:extLst>
-            <a:ext uri="{909E8E84-426E-40DD-AFC4-6F175D3DCCD1}">
-              <a14:hiddenFill xmlns:a14="http://schemas.microsoft.com/office/drawing/2010/main">
-                <a:noFill/>
-              </a14:hiddenFill>
-            </a:ext>
-          </a:extLst>
-        </p:spPr>
-      </p:cxnSp>
-      <p:cxnSp>
-        <p:nvCxnSpPr>
           <p:cNvPr id="194" name="Elbow Connector 193"/>
           <p:cNvCxnSpPr>
             <a:stCxn id="166" idx="3"/>
@@ -10251,9 +9904,9 @@
           <p:nvPr/>
         </p:nvCxnSpPr>
         <p:spPr bwMode="auto">
-          <a:xfrm>
-            <a:off x="8179457" y="3114667"/>
-            <a:ext cx="647836" cy="86266"/>
+          <a:xfrm flipV="1">
+            <a:off x="7737811" y="2973555"/>
+            <a:ext cx="801352" cy="1"/>
           </a:xfrm>
           <a:prstGeom prst="bentConnector3">
             <a:avLst/>
@@ -10379,7 +10032,7 @@
         </p:nvSpPr>
         <p:spPr bwMode="auto">
           <a:xfrm>
-            <a:off x="4739481" y="2149732"/>
+            <a:off x="4064571" y="2216407"/>
             <a:ext cx="585788" cy="171450"/>
           </a:xfrm>
           <a:prstGeom prst="rect">
@@ -10674,7 +10327,7 @@
         </p:nvSpPr>
         <p:spPr bwMode="auto">
           <a:xfrm>
-            <a:off x="7190013" y="1450906"/>
+            <a:off x="6956857" y="1385101"/>
             <a:ext cx="691260" cy="162419"/>
           </a:xfrm>
           <a:prstGeom prst="rect">
@@ -10746,7 +10399,7 @@
         </p:nvSpPr>
         <p:spPr bwMode="auto">
           <a:xfrm>
-            <a:off x="7246017" y="2579773"/>
+            <a:off x="6741349" y="2495663"/>
             <a:ext cx="691260" cy="162419"/>
           </a:xfrm>
           <a:prstGeom prst="rect">
@@ -10818,7 +10471,7 @@
         </p:nvSpPr>
         <p:spPr bwMode="auto">
           <a:xfrm>
-            <a:off x="8127996" y="2886806"/>
+            <a:off x="7705028" y="2795455"/>
             <a:ext cx="691260" cy="162419"/>
           </a:xfrm>
           <a:prstGeom prst="rect">
@@ -10868,78 +10521,6 @@
                 <a:cs typeface="Calibri" pitchFamily="34" charset="0"/>
               </a:rPr>
               <a:t>owner</a:t>
-            </a:r>
-            <a:endParaRPr lang="en-US" sz="1000" b="1" dirty="0" smtClean="0">
-              <a:solidFill>
-                <a:schemeClr val="tx1"/>
-              </a:solidFill>
-              <a:latin typeface="Calibri" pitchFamily="34" charset="0"/>
-              <a:ea typeface="+mn-ea"/>
-              <a:cs typeface="Calibri" pitchFamily="34" charset="0"/>
-            </a:endParaRPr>
-          </a:p>
-        </p:txBody>
-      </p:sp>
-      <p:sp>
-        <p:nvSpPr>
-          <p:cNvPr id="214" name="Rectangle 92"/>
-          <p:cNvSpPr>
-            <a:spLocks noChangeArrowheads="1"/>
-          </p:cNvSpPr>
-          <p:nvPr/>
-        </p:nvSpPr>
-        <p:spPr bwMode="auto">
-          <a:xfrm>
-            <a:off x="8187110" y="4404155"/>
-            <a:ext cx="691260" cy="162419"/>
-          </a:xfrm>
-          <a:prstGeom prst="rect">
-            <a:avLst/>
-          </a:prstGeom>
-          <a:noFill/>
-          <a:ln>
-            <a:noFill/>
-          </a:ln>
-          <a:effectLst>
-            <a:outerShdw blurRad="40000" dist="20000" dir="5400000" rotWithShape="0">
-              <a:srgbClr val="808080">
-                <a:alpha val="37999"/>
-              </a:srgbClr>
-            </a:outerShdw>
-          </a:effectLst>
-          <a:extLst>
-            <a:ext uri="{909E8E84-426E-40DD-AFC4-6F175D3DCCD1}">
-              <a14:hiddenFill xmlns:a14="http://schemas.microsoft.com/office/drawing/2010/main">
-                <a:solidFill>
-                  <a:srgbClr val="FFFFFF"/>
-                </a:solidFill>
-              </a14:hiddenFill>
-            </a:ext>
-            <a:ext uri="{91240B29-F687-4F45-9708-019B960494DF}">
-              <a14:hiddenLine xmlns:a14="http://schemas.microsoft.com/office/drawing/2010/main" w="9525">
-                <a:solidFill>
-                  <a:srgbClr val="000000"/>
-                </a:solidFill>
-                <a:miter lim="800000"/>
-                <a:headEnd/>
-                <a:tailEnd/>
-              </a14:hiddenLine>
-            </a:ext>
-          </a:extLst>
-        </p:spPr>
-        <p:txBody>
-          <a:bodyPr lIns="0" tIns="0" rIns="0" bIns="0"/>
-          <a:lstStyle/>
-          <a:p>
-            <a:pPr marL="108000" eaLnBrk="1" hangingPunct="1">
-              <a:defRPr/>
-            </a:pPr>
-            <a:r>
-              <a:rPr lang="en-US" sz="1000" b="1" dirty="0" smtClean="0">
-                <a:latin typeface="Calibri" pitchFamily="34" charset="0"/>
-                <a:cs typeface="Calibri" pitchFamily="34" charset="0"/>
-              </a:rPr>
-              <a:t>invitees</a:t>
             </a:r>
             <a:endParaRPr lang="en-US" sz="1000" b="1" dirty="0" smtClean="0">
               <a:solidFill>
@@ -10962,7 +10543,7 @@
         </p:nvSpPr>
         <p:spPr bwMode="auto">
           <a:xfrm>
-            <a:off x="7321548" y="4115776"/>
+            <a:off x="6514351" y="4155379"/>
             <a:ext cx="691260" cy="162419"/>
           </a:xfrm>
           <a:prstGeom prst="rect">
@@ -11014,70 +10595,6 @@
               <a:t>calendar</a:t>
             </a:r>
             <a:endParaRPr lang="en-US" sz="1000" b="1" dirty="0" smtClean="0">
-              <a:solidFill>
-                <a:schemeClr val="tx1"/>
-              </a:solidFill>
-              <a:latin typeface="Calibri" pitchFamily="34" charset="0"/>
-              <a:ea typeface="+mn-ea"/>
-              <a:cs typeface="Calibri" pitchFamily="34" charset="0"/>
-            </a:endParaRPr>
-          </a:p>
-        </p:txBody>
-      </p:sp>
-      <p:sp>
-        <p:nvSpPr>
-          <p:cNvPr id="219" name="Rectangle 92"/>
-          <p:cNvSpPr>
-            <a:spLocks noChangeArrowheads="1"/>
-          </p:cNvSpPr>
-          <p:nvPr/>
-        </p:nvSpPr>
-        <p:spPr bwMode="auto">
-          <a:xfrm>
-            <a:off x="7142160" y="4258048"/>
-            <a:ext cx="179388" cy="180975"/>
-          </a:xfrm>
-          <a:prstGeom prst="rect">
-            <a:avLst/>
-          </a:prstGeom>
-          <a:gradFill rotWithShape="1">
-            <a:gsLst>
-              <a:gs pos="0">
-                <a:srgbClr val="FFDCDB"/>
-              </a:gs>
-              <a:gs pos="64999">
-                <a:srgbClr val="FFAAA9"/>
-              </a:gs>
-              <a:gs pos="100000">
-                <a:srgbClr val="FF8683"/>
-              </a:gs>
-            </a:gsLst>
-            <a:lin ang="5400000" scaled="1"/>
-          </a:gradFill>
-          <a:ln w="9525">
-            <a:solidFill>
-              <a:srgbClr val="ED261B"/>
-            </a:solidFill>
-            <a:miter lim="800000"/>
-            <a:headEnd/>
-            <a:tailEnd/>
-          </a:ln>
-          <a:effectLst>
-            <a:outerShdw blurRad="40000" dist="20000" dir="5400000" rotWithShape="0">
-              <a:srgbClr val="808080">
-                <a:alpha val="37999"/>
-              </a:srgbClr>
-            </a:outerShdw>
-          </a:effectLst>
-        </p:spPr>
-        <p:txBody>
-          <a:bodyPr lIns="0" tIns="0" rIns="0" bIns="0" anchor="ctr"/>
-          <a:lstStyle/>
-          <a:p>
-            <a:pPr algn="ctr" eaLnBrk="1" hangingPunct="1">
-              <a:defRPr/>
-            </a:pPr>
-            <a:endParaRPr lang="en-US" b="0" dirty="0">
               <a:solidFill>
                 <a:schemeClr val="tx1"/>
               </a:solidFill>
@@ -11098,7 +10615,7 @@
         </p:nvSpPr>
         <p:spPr bwMode="auto">
           <a:xfrm>
-            <a:off x="7340600" y="3457119"/>
+            <a:off x="6813649" y="3277121"/>
             <a:ext cx="691260" cy="162419"/>
           </a:xfrm>
           <a:prstGeom prst="rect">
@@ -11160,6 +10677,233 @@
           </a:p>
         </p:txBody>
       </p:sp>
+      <p:grpSp>
+        <p:nvGrpSpPr>
+          <p:cNvPr id="69" name="Group 40"/>
+          <p:cNvGrpSpPr>
+            <a:grpSpLocks/>
+          </p:cNvGrpSpPr>
+          <p:nvPr/>
+        </p:nvGrpSpPr>
+        <p:grpSpPr bwMode="auto">
+          <a:xfrm>
+            <a:off x="7109098" y="4219555"/>
+            <a:ext cx="250825" cy="247650"/>
+            <a:chOff x="1081088" y="1468438"/>
+            <a:chExt cx="250246" cy="248358"/>
+          </a:xfrm>
+        </p:grpSpPr>
+        <p:sp>
+          <p:nvSpPr>
+            <p:cNvPr id="70" name="Rectangle 92"/>
+            <p:cNvSpPr>
+              <a:spLocks noChangeArrowheads="1"/>
+            </p:cNvSpPr>
+            <p:nvPr/>
+          </p:nvSpPr>
+          <p:spPr bwMode="auto">
+            <a:xfrm>
+              <a:off x="1081088" y="1468438"/>
+              <a:ext cx="180557" cy="181492"/>
+            </a:xfrm>
+            <a:prstGeom prst="rect">
+              <a:avLst/>
+            </a:prstGeom>
+            <a:gradFill rotWithShape="1">
+              <a:gsLst>
+                <a:gs pos="0">
+                  <a:srgbClr val="FFDCDB"/>
+                </a:gs>
+                <a:gs pos="64999">
+                  <a:srgbClr val="FFAAA9"/>
+                </a:gs>
+                <a:gs pos="100000">
+                  <a:srgbClr val="FF8683"/>
+                </a:gs>
+              </a:gsLst>
+              <a:lin ang="5400000" scaled="1"/>
+            </a:gradFill>
+            <a:ln w="9525">
+              <a:solidFill>
+                <a:srgbClr val="ED261B"/>
+              </a:solidFill>
+              <a:miter lim="800000"/>
+              <a:headEnd/>
+              <a:tailEnd/>
+            </a:ln>
+            <a:effectLst>
+              <a:outerShdw blurRad="40000" dist="20000" dir="5400000" rotWithShape="0">
+                <a:srgbClr val="808080">
+                  <a:alpha val="37999"/>
+                </a:srgbClr>
+              </a:outerShdw>
+            </a:effectLst>
+          </p:spPr>
+          <p:txBody>
+            <a:bodyPr lIns="0" tIns="0" rIns="0" bIns="0" anchor="ctr"/>
+            <a:lstStyle/>
+            <a:p>
+              <a:pPr algn="ctr" fontAlgn="base">
+                <a:spcBef>
+                  <a:spcPct val="0"/>
+                </a:spcBef>
+                <a:spcAft>
+                  <a:spcPct val="0"/>
+                </a:spcAft>
+                <a:defRPr/>
+              </a:pPr>
+              <a:endParaRPr lang="en-US" dirty="0">
+                <a:solidFill>
+                  <a:srgbClr val="262626"/>
+                </a:solidFill>
+                <a:latin typeface="Calibri" pitchFamily="34" charset="0"/>
+                <a:ea typeface="MS PGothic" panose="020B0600070205080204" pitchFamily="34" charset="-128"/>
+                <a:cs typeface="Calibri" pitchFamily="34" charset="0"/>
+              </a:endParaRPr>
+            </a:p>
+          </p:txBody>
+        </p:sp>
+        <p:sp>
+          <p:nvSpPr>
+            <p:cNvPr id="71" name="Rectangle 92"/>
+            <p:cNvSpPr>
+              <a:spLocks noChangeArrowheads="1"/>
+            </p:cNvSpPr>
+            <p:nvPr/>
+          </p:nvSpPr>
+          <p:spPr bwMode="auto">
+            <a:xfrm>
+              <a:off x="1115932" y="1501870"/>
+              <a:ext cx="180557" cy="181492"/>
+            </a:xfrm>
+            <a:prstGeom prst="rect">
+              <a:avLst/>
+            </a:prstGeom>
+            <a:gradFill rotWithShape="1">
+              <a:gsLst>
+                <a:gs pos="0">
+                  <a:srgbClr val="FFDCDB"/>
+                </a:gs>
+                <a:gs pos="64999">
+                  <a:srgbClr val="FFAAA9"/>
+                </a:gs>
+                <a:gs pos="100000">
+                  <a:srgbClr val="FF8683"/>
+                </a:gs>
+              </a:gsLst>
+              <a:lin ang="5400000" scaled="1"/>
+            </a:gradFill>
+            <a:ln w="9525">
+              <a:solidFill>
+                <a:srgbClr val="ED261B"/>
+              </a:solidFill>
+              <a:miter lim="800000"/>
+              <a:headEnd/>
+              <a:tailEnd/>
+            </a:ln>
+            <a:effectLst>
+              <a:outerShdw blurRad="40000" dist="20000" dir="5400000" rotWithShape="0">
+                <a:srgbClr val="808080">
+                  <a:alpha val="37999"/>
+                </a:srgbClr>
+              </a:outerShdw>
+            </a:effectLst>
+          </p:spPr>
+          <p:txBody>
+            <a:bodyPr lIns="0" tIns="0" rIns="0" bIns="0" anchor="ctr"/>
+            <a:lstStyle/>
+            <a:p>
+              <a:pPr algn="ctr" fontAlgn="base">
+                <a:spcBef>
+                  <a:spcPct val="0"/>
+                </a:spcBef>
+                <a:spcAft>
+                  <a:spcPct val="0"/>
+                </a:spcAft>
+                <a:defRPr/>
+              </a:pPr>
+              <a:endParaRPr lang="en-US" dirty="0">
+                <a:solidFill>
+                  <a:srgbClr val="262626"/>
+                </a:solidFill>
+                <a:latin typeface="Calibri" pitchFamily="34" charset="0"/>
+                <a:ea typeface="MS PGothic" panose="020B0600070205080204" pitchFamily="34" charset="-128"/>
+                <a:cs typeface="Calibri" pitchFamily="34" charset="0"/>
+              </a:endParaRPr>
+            </a:p>
+          </p:txBody>
+        </p:sp>
+        <p:sp>
+          <p:nvSpPr>
+            <p:cNvPr id="72" name="Rectangle 92"/>
+            <p:cNvSpPr>
+              <a:spLocks noChangeArrowheads="1"/>
+            </p:cNvSpPr>
+            <p:nvPr/>
+          </p:nvSpPr>
+          <p:spPr bwMode="auto">
+            <a:xfrm>
+              <a:off x="1150777" y="1535304"/>
+              <a:ext cx="180557" cy="181492"/>
+            </a:xfrm>
+            <a:prstGeom prst="rect">
+              <a:avLst/>
+            </a:prstGeom>
+            <a:gradFill rotWithShape="1">
+              <a:gsLst>
+                <a:gs pos="0">
+                  <a:srgbClr val="FFDCDB"/>
+                </a:gs>
+                <a:gs pos="64999">
+                  <a:srgbClr val="FFAAA9"/>
+                </a:gs>
+                <a:gs pos="100000">
+                  <a:srgbClr val="FF8683"/>
+                </a:gs>
+              </a:gsLst>
+              <a:lin ang="5400000" scaled="1"/>
+            </a:gradFill>
+            <a:ln w="9525">
+              <a:solidFill>
+                <a:srgbClr val="ED261B"/>
+              </a:solidFill>
+              <a:miter lim="800000"/>
+              <a:headEnd/>
+              <a:tailEnd/>
+            </a:ln>
+            <a:effectLst>
+              <a:outerShdw blurRad="40000" dist="20000" dir="5400000" rotWithShape="0">
+                <a:srgbClr val="808080">
+                  <a:alpha val="37999"/>
+                </a:srgbClr>
+              </a:outerShdw>
+            </a:effectLst>
+          </p:spPr>
+          <p:txBody>
+            <a:bodyPr lIns="0" tIns="0" rIns="0" bIns="0" anchor="ctr"/>
+            <a:lstStyle/>
+            <a:p>
+              <a:pPr algn="ctr" fontAlgn="base">
+                <a:spcBef>
+                  <a:spcPct val="0"/>
+                </a:spcBef>
+                <a:spcAft>
+                  <a:spcPct val="0"/>
+                </a:spcAft>
+                <a:defRPr/>
+              </a:pPr>
+              <a:endParaRPr lang="en-US" dirty="0">
+                <a:solidFill>
+                  <a:srgbClr val="262626"/>
+                </a:solidFill>
+                <a:latin typeface="Calibri" pitchFamily="34" charset="0"/>
+                <a:ea typeface="MS PGothic" panose="020B0600070205080204" pitchFamily="34" charset="-128"/>
+                <a:cs typeface="Calibri" pitchFamily="34" charset="0"/>
+              </a:endParaRPr>
+            </a:p>
+          </p:txBody>
+        </p:sp>
+      </p:grpSp>
     </p:spTree>
     <p:extLst>
       <p:ext uri="{BB962C8B-B14F-4D97-AF65-F5344CB8AC3E}">

</xml_diff>

<commit_message>
Defined services in APP-META
- Updated 'globals' service
- Created appropriate code files for services
- Formatted APP-META
</commit_message>
<xml_diff>
--- a/package/doc/Resource Model.pptx
+++ b/package/doc/Resource Model.pptx
@@ -9854,15 +9854,15 @@
           <p:cNvPr id="186" name="Прямая со стрелкой 2"/>
           <p:cNvCxnSpPr>
             <a:cxnSpLocks noChangeShapeType="1"/>
-            <a:stCxn id="70" idx="0"/>
+            <a:stCxn id="65" idx="0"/>
             <a:endCxn id="184" idx="2"/>
           </p:cNvCxnSpPr>
           <p:nvPr/>
         </p:nvCxnSpPr>
         <p:spPr bwMode="auto">
           <a:xfrm rot="16200000" flipV="1">
-            <a:off x="6563976" y="3583945"/>
-            <a:ext cx="851946" cy="419274"/>
+            <a:off x="6552793" y="3595129"/>
+            <a:ext cx="893039" cy="437999"/>
           </a:xfrm>
           <a:prstGeom prst="bentConnector3">
             <a:avLst>
@@ -10032,7 +10032,7 @@
         </p:nvSpPr>
         <p:spPr bwMode="auto">
           <a:xfrm>
-            <a:off x="4064571" y="2216407"/>
+            <a:off x="4059546" y="2641857"/>
             <a:ext cx="585788" cy="171450"/>
           </a:xfrm>
           <a:prstGeom prst="rect">
@@ -10108,7 +10108,7 @@
         </p:nvSpPr>
         <p:spPr bwMode="auto">
           <a:xfrm>
-            <a:off x="6018943" y="1294949"/>
+            <a:off x="5746750" y="1060170"/>
             <a:ext cx="585788" cy="171450"/>
           </a:xfrm>
           <a:prstGeom prst="rect">
@@ -10153,14 +10153,14 @@
               <a:defRPr/>
             </a:pPr>
             <a:r>
-              <a:rPr lang="en-US" sz="1000" b="1" dirty="0" smtClean="0">
+              <a:rPr lang="en-US" sz="1000" b="1" dirty="0" err="1" smtClean="0">
                 <a:latin typeface="Calibri" pitchFamily="34" charset="0"/>
                 <a:cs typeface="Calibri" pitchFamily="34" charset="0"/>
               </a:rPr>
               <a:t>g</a:t>
             </a:r>
             <a:r>
-              <a:rPr lang="en-US" sz="1000" b="1" dirty="0" smtClean="0">
+              <a:rPr lang="en-US" sz="1000" b="1" dirty="0" err="1" smtClean="0">
                 <a:solidFill>
                   <a:schemeClr val="tx1"/>
                 </a:solidFill>
@@ -10168,8 +10168,16 @@
                 <a:ea typeface="+mn-ea"/>
                 <a:cs typeface="Calibri" pitchFamily="34" charset="0"/>
               </a:rPr>
-              <a:t>lobal</a:t>
-            </a:r>
+              <a:t>lobals</a:t>
+            </a:r>
+            <a:endParaRPr lang="en-US" sz="1000" b="1" dirty="0" smtClean="0">
+              <a:solidFill>
+                <a:schemeClr val="tx1"/>
+              </a:solidFill>
+              <a:latin typeface="Calibri" pitchFamily="34" charset="0"/>
+              <a:ea typeface="+mn-ea"/>
+              <a:cs typeface="Calibri" pitchFamily="34" charset="0"/>
+            </a:endParaRPr>
           </a:p>
         </p:txBody>
       </p:sp>
@@ -10677,233 +10685,76 @@
           </a:p>
         </p:txBody>
       </p:sp>
-      <p:grpSp>
-        <p:nvGrpSpPr>
-          <p:cNvPr id="69" name="Group 40"/>
-          <p:cNvGrpSpPr>
-            <a:grpSpLocks/>
-          </p:cNvGrpSpPr>
+      <p:sp>
+        <p:nvSpPr>
+          <p:cNvPr id="65" name="Rectangle 92"/>
+          <p:cNvSpPr>
+            <a:spLocks noChangeArrowheads="1"/>
+          </p:cNvSpPr>
           <p:nvPr/>
-        </p:nvGrpSpPr>
-        <p:grpSpPr bwMode="auto">
+        </p:nvSpPr>
+        <p:spPr bwMode="auto">
           <a:xfrm>
-            <a:off x="7109098" y="4219555"/>
-            <a:ext cx="250825" cy="247650"/>
-            <a:chOff x="1081088" y="1468438"/>
-            <a:chExt cx="250246" cy="248358"/>
-          </a:xfrm>
-        </p:grpSpPr>
-        <p:sp>
-          <p:nvSpPr>
-            <p:cNvPr id="70" name="Rectangle 92"/>
-            <p:cNvSpPr>
-              <a:spLocks noChangeArrowheads="1"/>
-            </p:cNvSpPr>
-            <p:nvPr/>
-          </p:nvSpPr>
-          <p:spPr bwMode="auto">
-            <a:xfrm>
-              <a:off x="1081088" y="1468438"/>
-              <a:ext cx="180557" cy="181492"/>
-            </a:xfrm>
-            <a:prstGeom prst="rect">
-              <a:avLst/>
-            </a:prstGeom>
-            <a:gradFill rotWithShape="1">
-              <a:gsLst>
-                <a:gs pos="0">
-                  <a:srgbClr val="FFDCDB"/>
-                </a:gs>
-                <a:gs pos="64999">
-                  <a:srgbClr val="FFAAA9"/>
-                </a:gs>
-                <a:gs pos="100000">
-                  <a:srgbClr val="FF8683"/>
-                </a:gs>
-              </a:gsLst>
-              <a:lin ang="5400000" scaled="1"/>
-            </a:gradFill>
-            <a:ln w="9525">
+            <a:off x="7128617" y="4260648"/>
+            <a:ext cx="179388" cy="180975"/>
+          </a:xfrm>
+          <a:prstGeom prst="rect">
+            <a:avLst/>
+          </a:prstGeom>
+          <a:gradFill rotWithShape="1">
+            <a:gsLst>
+              <a:gs pos="0">
+                <a:srgbClr val="FFDCDB"/>
+              </a:gs>
+              <a:gs pos="64999">
+                <a:srgbClr val="FFAAA9"/>
+              </a:gs>
+              <a:gs pos="100000">
+                <a:srgbClr val="FF8683"/>
+              </a:gs>
+            </a:gsLst>
+            <a:lin ang="5400000" scaled="1"/>
+          </a:gradFill>
+          <a:ln w="9525">
+            <a:solidFill>
+              <a:srgbClr val="ED261B"/>
+            </a:solidFill>
+            <a:miter lim="800000"/>
+            <a:headEnd/>
+            <a:tailEnd/>
+          </a:ln>
+          <a:effectLst>
+            <a:outerShdw blurRad="40000" dist="20000" dir="5400000" rotWithShape="0">
+              <a:srgbClr val="808080">
+                <a:alpha val="37999"/>
+              </a:srgbClr>
+            </a:outerShdw>
+          </a:effectLst>
+        </p:spPr>
+        <p:txBody>
+          <a:bodyPr lIns="0" tIns="0" rIns="0" bIns="0" anchor="ctr"/>
+          <a:lstStyle/>
+          <a:p>
+            <a:pPr algn="ctr" fontAlgn="base">
+              <a:spcBef>
+                <a:spcPct val="0"/>
+              </a:spcBef>
+              <a:spcAft>
+                <a:spcPct val="0"/>
+              </a:spcAft>
+              <a:defRPr/>
+            </a:pPr>
+            <a:endParaRPr lang="en-US" dirty="0">
               <a:solidFill>
-                <a:srgbClr val="ED261B"/>
+                <a:srgbClr val="262626"/>
               </a:solidFill>
-              <a:miter lim="800000"/>
-              <a:headEnd/>
-              <a:tailEnd/>
-            </a:ln>
-            <a:effectLst>
-              <a:outerShdw blurRad="40000" dist="20000" dir="5400000" rotWithShape="0">
-                <a:srgbClr val="808080">
-                  <a:alpha val="37999"/>
-                </a:srgbClr>
-              </a:outerShdw>
-            </a:effectLst>
-          </p:spPr>
-          <p:txBody>
-            <a:bodyPr lIns="0" tIns="0" rIns="0" bIns="0" anchor="ctr"/>
-            <a:lstStyle/>
-            <a:p>
-              <a:pPr algn="ctr" fontAlgn="base">
-                <a:spcBef>
-                  <a:spcPct val="0"/>
-                </a:spcBef>
-                <a:spcAft>
-                  <a:spcPct val="0"/>
-                </a:spcAft>
-                <a:defRPr/>
-              </a:pPr>
-              <a:endParaRPr lang="en-US" dirty="0">
-                <a:solidFill>
-                  <a:srgbClr val="262626"/>
-                </a:solidFill>
-                <a:latin typeface="Calibri" pitchFamily="34" charset="0"/>
-                <a:ea typeface="MS PGothic" panose="020B0600070205080204" pitchFamily="34" charset="-128"/>
-                <a:cs typeface="Calibri" pitchFamily="34" charset="0"/>
-              </a:endParaRPr>
-            </a:p>
-          </p:txBody>
-        </p:sp>
-        <p:sp>
-          <p:nvSpPr>
-            <p:cNvPr id="71" name="Rectangle 92"/>
-            <p:cNvSpPr>
-              <a:spLocks noChangeArrowheads="1"/>
-            </p:cNvSpPr>
-            <p:nvPr/>
-          </p:nvSpPr>
-          <p:spPr bwMode="auto">
-            <a:xfrm>
-              <a:off x="1115932" y="1501870"/>
-              <a:ext cx="180557" cy="181492"/>
-            </a:xfrm>
-            <a:prstGeom prst="rect">
-              <a:avLst/>
-            </a:prstGeom>
-            <a:gradFill rotWithShape="1">
-              <a:gsLst>
-                <a:gs pos="0">
-                  <a:srgbClr val="FFDCDB"/>
-                </a:gs>
-                <a:gs pos="64999">
-                  <a:srgbClr val="FFAAA9"/>
-                </a:gs>
-                <a:gs pos="100000">
-                  <a:srgbClr val="FF8683"/>
-                </a:gs>
-              </a:gsLst>
-              <a:lin ang="5400000" scaled="1"/>
-            </a:gradFill>
-            <a:ln w="9525">
-              <a:solidFill>
-                <a:srgbClr val="ED261B"/>
-              </a:solidFill>
-              <a:miter lim="800000"/>
-              <a:headEnd/>
-              <a:tailEnd/>
-            </a:ln>
-            <a:effectLst>
-              <a:outerShdw blurRad="40000" dist="20000" dir="5400000" rotWithShape="0">
-                <a:srgbClr val="808080">
-                  <a:alpha val="37999"/>
-                </a:srgbClr>
-              </a:outerShdw>
-            </a:effectLst>
-          </p:spPr>
-          <p:txBody>
-            <a:bodyPr lIns="0" tIns="0" rIns="0" bIns="0" anchor="ctr"/>
-            <a:lstStyle/>
-            <a:p>
-              <a:pPr algn="ctr" fontAlgn="base">
-                <a:spcBef>
-                  <a:spcPct val="0"/>
-                </a:spcBef>
-                <a:spcAft>
-                  <a:spcPct val="0"/>
-                </a:spcAft>
-                <a:defRPr/>
-              </a:pPr>
-              <a:endParaRPr lang="en-US" dirty="0">
-                <a:solidFill>
-                  <a:srgbClr val="262626"/>
-                </a:solidFill>
-                <a:latin typeface="Calibri" pitchFamily="34" charset="0"/>
-                <a:ea typeface="MS PGothic" panose="020B0600070205080204" pitchFamily="34" charset="-128"/>
-                <a:cs typeface="Calibri" pitchFamily="34" charset="0"/>
-              </a:endParaRPr>
-            </a:p>
-          </p:txBody>
-        </p:sp>
-        <p:sp>
-          <p:nvSpPr>
-            <p:cNvPr id="72" name="Rectangle 92"/>
-            <p:cNvSpPr>
-              <a:spLocks noChangeArrowheads="1"/>
-            </p:cNvSpPr>
-            <p:nvPr/>
-          </p:nvSpPr>
-          <p:spPr bwMode="auto">
-            <a:xfrm>
-              <a:off x="1150777" y="1535304"/>
-              <a:ext cx="180557" cy="181492"/>
-            </a:xfrm>
-            <a:prstGeom prst="rect">
-              <a:avLst/>
-            </a:prstGeom>
-            <a:gradFill rotWithShape="1">
-              <a:gsLst>
-                <a:gs pos="0">
-                  <a:srgbClr val="FFDCDB"/>
-                </a:gs>
-                <a:gs pos="64999">
-                  <a:srgbClr val="FFAAA9"/>
-                </a:gs>
-                <a:gs pos="100000">
-                  <a:srgbClr val="FF8683"/>
-                </a:gs>
-              </a:gsLst>
-              <a:lin ang="5400000" scaled="1"/>
-            </a:gradFill>
-            <a:ln w="9525">
-              <a:solidFill>
-                <a:srgbClr val="ED261B"/>
-              </a:solidFill>
-              <a:miter lim="800000"/>
-              <a:headEnd/>
-              <a:tailEnd/>
-            </a:ln>
-            <a:effectLst>
-              <a:outerShdw blurRad="40000" dist="20000" dir="5400000" rotWithShape="0">
-                <a:srgbClr val="808080">
-                  <a:alpha val="37999"/>
-                </a:srgbClr>
-              </a:outerShdw>
-            </a:effectLst>
-          </p:spPr>
-          <p:txBody>
-            <a:bodyPr lIns="0" tIns="0" rIns="0" bIns="0" anchor="ctr"/>
-            <a:lstStyle/>
-            <a:p>
-              <a:pPr algn="ctr" fontAlgn="base">
-                <a:spcBef>
-                  <a:spcPct val="0"/>
-                </a:spcBef>
-                <a:spcAft>
-                  <a:spcPct val="0"/>
-                </a:spcAft>
-                <a:defRPr/>
-              </a:pPr>
-              <a:endParaRPr lang="en-US" dirty="0">
-                <a:solidFill>
-                  <a:srgbClr val="262626"/>
-                </a:solidFill>
-                <a:latin typeface="Calibri" pitchFamily="34" charset="0"/>
-                <a:ea typeface="MS PGothic" panose="020B0600070205080204" pitchFamily="34" charset="-128"/>
-                <a:cs typeface="Calibri" pitchFamily="34" charset="0"/>
-              </a:endParaRPr>
-            </a:p>
-          </p:txBody>
-        </p:sp>
-      </p:grpSp>
+              <a:latin typeface="Calibri" pitchFamily="34" charset="0"/>
+              <a:ea typeface="MS PGothic" panose="020B0600070205080204" pitchFamily="34" charset="-128"/>
+              <a:cs typeface="Calibri" pitchFamily="34" charset="0"/>
+            </a:endParaRPr>
+          </a:p>
+        </p:txBody>
+      </p:sp>
     </p:spTree>
     <p:extLst>
       <p:ext uri="{BB962C8B-B14F-4D97-AF65-F5344CB8AC3E}">

</xml_diff>